<commit_message>
modified OD yolo code
</commit_message>
<xml_diff>
--- a/object detection/YOLO/YOLO.pptx
+++ b/object detection/YOLO/YOLO.pptx
@@ -6,14 +6,14 @@
   </p:sldMasterIdLst>
   <p:sldIdLst>
     <p:sldId id="256" r:id="rId2"/>
-    <p:sldId id="261" r:id="rId3"/>
-    <p:sldId id="270" r:id="rId4"/>
-    <p:sldId id="271" r:id="rId5"/>
-    <p:sldId id="272" r:id="rId6"/>
-    <p:sldId id="257" r:id="rId7"/>
-    <p:sldId id="258" r:id="rId8"/>
-    <p:sldId id="259" r:id="rId9"/>
-    <p:sldId id="260" r:id="rId10"/>
+    <p:sldId id="257" r:id="rId3"/>
+    <p:sldId id="258" r:id="rId4"/>
+    <p:sldId id="259" r:id="rId5"/>
+    <p:sldId id="260" r:id="rId6"/>
+    <p:sldId id="261" r:id="rId7"/>
+    <p:sldId id="270" r:id="rId8"/>
+    <p:sldId id="271" r:id="rId9"/>
+    <p:sldId id="272" r:id="rId10"/>
     <p:sldId id="269" r:id="rId11"/>
     <p:sldId id="273" r:id="rId12"/>
     <p:sldId id="262" r:id="rId13"/>
@@ -272,7 +272,7 @@
           <a:p>
             <a:fld id="{F137A619-930B-4B04-809F-483324D0F580}" type="datetimeFigureOut">
               <a:rPr lang="en-IN" smtClean="0"/>
-              <a:t>25-09-2020</a:t>
+              <a:t>18-04-2021</a:t>
             </a:fld>
             <a:endParaRPr lang="en-IN"/>
           </a:p>
@@ -472,7 +472,7 @@
           <a:p>
             <a:fld id="{F137A619-930B-4B04-809F-483324D0F580}" type="datetimeFigureOut">
               <a:rPr lang="en-IN" smtClean="0"/>
-              <a:t>25-09-2020</a:t>
+              <a:t>18-04-2021</a:t>
             </a:fld>
             <a:endParaRPr lang="en-IN"/>
           </a:p>
@@ -682,7 +682,7 @@
           <a:p>
             <a:fld id="{F137A619-930B-4B04-809F-483324D0F580}" type="datetimeFigureOut">
               <a:rPr lang="en-IN" smtClean="0"/>
-              <a:t>25-09-2020</a:t>
+              <a:t>18-04-2021</a:t>
             </a:fld>
             <a:endParaRPr lang="en-IN"/>
           </a:p>
@@ -882,7 +882,7 @@
           <a:p>
             <a:fld id="{F137A619-930B-4B04-809F-483324D0F580}" type="datetimeFigureOut">
               <a:rPr lang="en-IN" smtClean="0"/>
-              <a:t>25-09-2020</a:t>
+              <a:t>18-04-2021</a:t>
             </a:fld>
             <a:endParaRPr lang="en-IN"/>
           </a:p>
@@ -1158,7 +1158,7 @@
           <a:p>
             <a:fld id="{F137A619-930B-4B04-809F-483324D0F580}" type="datetimeFigureOut">
               <a:rPr lang="en-IN" smtClean="0"/>
-              <a:t>25-09-2020</a:t>
+              <a:t>18-04-2021</a:t>
             </a:fld>
             <a:endParaRPr lang="en-IN"/>
           </a:p>
@@ -1426,7 +1426,7 @@
           <a:p>
             <a:fld id="{F137A619-930B-4B04-809F-483324D0F580}" type="datetimeFigureOut">
               <a:rPr lang="en-IN" smtClean="0"/>
-              <a:t>25-09-2020</a:t>
+              <a:t>18-04-2021</a:t>
             </a:fld>
             <a:endParaRPr lang="en-IN"/>
           </a:p>
@@ -1841,7 +1841,7 @@
           <a:p>
             <a:fld id="{F137A619-930B-4B04-809F-483324D0F580}" type="datetimeFigureOut">
               <a:rPr lang="en-IN" smtClean="0"/>
-              <a:t>25-09-2020</a:t>
+              <a:t>18-04-2021</a:t>
             </a:fld>
             <a:endParaRPr lang="en-IN"/>
           </a:p>
@@ -1983,7 +1983,7 @@
           <a:p>
             <a:fld id="{F137A619-930B-4B04-809F-483324D0F580}" type="datetimeFigureOut">
               <a:rPr lang="en-IN" smtClean="0"/>
-              <a:t>25-09-2020</a:t>
+              <a:t>18-04-2021</a:t>
             </a:fld>
             <a:endParaRPr lang="en-IN"/>
           </a:p>
@@ -2096,7 +2096,7 @@
           <a:p>
             <a:fld id="{F137A619-930B-4B04-809F-483324D0F580}" type="datetimeFigureOut">
               <a:rPr lang="en-IN" smtClean="0"/>
-              <a:t>25-09-2020</a:t>
+              <a:t>18-04-2021</a:t>
             </a:fld>
             <a:endParaRPr lang="en-IN"/>
           </a:p>
@@ -2409,7 +2409,7 @@
           <a:p>
             <a:fld id="{F137A619-930B-4B04-809F-483324D0F580}" type="datetimeFigureOut">
               <a:rPr lang="en-IN" smtClean="0"/>
-              <a:t>25-09-2020</a:t>
+              <a:t>18-04-2021</a:t>
             </a:fld>
             <a:endParaRPr lang="en-IN"/>
           </a:p>
@@ -2698,7 +2698,7 @@
           <a:p>
             <a:fld id="{F137A619-930B-4B04-809F-483324D0F580}" type="datetimeFigureOut">
               <a:rPr lang="en-IN" smtClean="0"/>
-              <a:t>25-09-2020</a:t>
+              <a:t>18-04-2021</a:t>
             </a:fld>
             <a:endParaRPr lang="en-IN"/>
           </a:p>
@@ -2941,7 +2941,7 @@
           <a:p>
             <a:fld id="{F137A619-930B-4B04-809F-483324D0F580}" type="datetimeFigureOut">
               <a:rPr lang="en-IN" smtClean="0"/>
-              <a:t>25-09-2020</a:t>
+              <a:t>18-04-2021</a:t>
             </a:fld>
             <a:endParaRPr lang="en-IN"/>
           </a:p>
@@ -3736,6 +3736,624 @@
           <p:cNvPr id="2" name="Title 1">
             <a:extLst>
               <a:ext uri="{FF2B5EF4-FFF2-40B4-BE49-F238E27FC236}">
+                <a16:creationId xmlns:a16="http://schemas.microsoft.com/office/drawing/2014/main" id="{0FDCA47D-4704-4B1D-849B-3D9F53B708FF}"/>
+              </a:ext>
+            </a:extLst>
+          </p:cNvPr>
+          <p:cNvSpPr>
+            <a:spLocks noGrp="1"/>
+          </p:cNvSpPr>
+          <p:nvPr>
+            <p:ph type="title"/>
+          </p:nvPr>
+        </p:nvSpPr>
+        <p:spPr/>
+        <p:txBody>
+          <a:bodyPr/>
+          <a:lstStyle/>
+          <a:p>
+            <a:r>
+              <a:rPr lang="en-IN" dirty="0"/>
+              <a:t>YOLO</a:t>
+            </a:r>
+          </a:p>
+        </p:txBody>
+      </p:sp>
+      <p:sp>
+        <p:nvSpPr>
+          <p:cNvPr id="3" name="Content Placeholder 2">
+            <a:extLst>
+              <a:ext uri="{FF2B5EF4-FFF2-40B4-BE49-F238E27FC236}">
+                <a16:creationId xmlns:a16="http://schemas.microsoft.com/office/drawing/2014/main" id="{225A9CBB-56EF-439F-B4B4-42094E01F37C}"/>
+              </a:ext>
+            </a:extLst>
+          </p:cNvPr>
+          <p:cNvSpPr>
+            <a:spLocks noGrp="1"/>
+          </p:cNvSpPr>
+          <p:nvPr>
+            <p:ph idx="1"/>
+          </p:nvPr>
+        </p:nvSpPr>
+        <p:spPr/>
+        <p:txBody>
+          <a:bodyPr/>
+          <a:lstStyle/>
+          <a:p>
+            <a:r>
+              <a:rPr lang="en-US" dirty="0"/>
+              <a:t>YOLO actually looks at the image just once (hence its name: You Only Look Once) but in a clever way.</a:t>
+            </a:r>
+          </a:p>
+          <a:p>
+            <a:r>
+              <a:rPr lang="en-US" dirty="0"/>
+              <a:t>YOLO divides up the image into a grid of 13 by 13 cells:</a:t>
+            </a:r>
+          </a:p>
+          <a:p>
+            <a:endParaRPr lang="en-IN" dirty="0"/>
+          </a:p>
+        </p:txBody>
+      </p:sp>
+      <p:pic>
+        <p:nvPicPr>
+          <p:cNvPr id="1026" name="Picture 2" descr="Alt Text">
+            <a:extLst>
+              <a:ext uri="{FF2B5EF4-FFF2-40B4-BE49-F238E27FC236}">
+                <a16:creationId xmlns:a16="http://schemas.microsoft.com/office/drawing/2014/main" id="{45787048-A5B7-4C6B-9476-C4F87C2254A5}"/>
+              </a:ext>
+            </a:extLst>
+          </p:cNvPr>
+          <p:cNvPicPr>
+            <a:picLocks noChangeAspect="1" noChangeArrowheads="1"/>
+          </p:cNvPicPr>
+          <p:nvPr/>
+        </p:nvPicPr>
+        <p:blipFill>
+          <a:blip r:embed="rId2">
+            <a:extLst>
+              <a:ext uri="{28A0092B-C50C-407E-A947-70E740481C1C}">
+                <a14:useLocalDpi xmlns:a14="http://schemas.microsoft.com/office/drawing/2010/main" val="0"/>
+              </a:ext>
+            </a:extLst>
+          </a:blip>
+          <a:srcRect/>
+          <a:stretch>
+            <a:fillRect/>
+          </a:stretch>
+        </p:blipFill>
+        <p:spPr bwMode="auto">
+          <a:xfrm>
+            <a:off x="3842808" y="3429000"/>
+            <a:ext cx="3015192" cy="3015192"/>
+          </a:xfrm>
+          <a:prstGeom prst="rect">
+            <a:avLst/>
+          </a:prstGeom>
+          <a:noFill/>
+          <a:extLst>
+            <a:ext uri="{909E8E84-426E-40DD-AFC4-6F175D3DCCD1}">
+              <a14:hiddenFill xmlns:a14="http://schemas.microsoft.com/office/drawing/2010/main">
+                <a:solidFill>
+                  <a:srgbClr val="FFFFFF"/>
+                </a:solidFill>
+              </a14:hiddenFill>
+            </a:ext>
+          </a:extLst>
+        </p:spPr>
+      </p:pic>
+    </p:spTree>
+    <p:extLst>
+      <p:ext uri="{BB962C8B-B14F-4D97-AF65-F5344CB8AC3E}">
+        <p14:creationId xmlns:p14="http://schemas.microsoft.com/office/powerpoint/2010/main" val="796314057"/>
+      </p:ext>
+    </p:extLst>
+  </p:cSld>
+  <p:clrMapOvr>
+    <a:masterClrMapping/>
+  </p:clrMapOvr>
+</p:sld>
+</file>
+
+<file path=ppt/slides/slide3.xml><?xml version="1.0" encoding="utf-8"?>
+<p:sld xmlns:a="http://schemas.openxmlformats.org/drawingml/2006/main" xmlns:r="http://schemas.openxmlformats.org/officeDocument/2006/relationships" xmlns:p="http://schemas.openxmlformats.org/presentationml/2006/main">
+  <p:cSld>
+    <p:spTree>
+      <p:nvGrpSpPr>
+        <p:cNvPr id="1" name=""/>
+        <p:cNvGrpSpPr/>
+        <p:nvPr/>
+      </p:nvGrpSpPr>
+      <p:grpSpPr>
+        <a:xfrm>
+          <a:off x="0" y="0"/>
+          <a:ext cx="0" cy="0"/>
+          <a:chOff x="0" y="0"/>
+          <a:chExt cx="0" cy="0"/>
+        </a:xfrm>
+      </p:grpSpPr>
+      <p:sp>
+        <p:nvSpPr>
+          <p:cNvPr id="2" name="Title 1">
+            <a:extLst>
+              <a:ext uri="{FF2B5EF4-FFF2-40B4-BE49-F238E27FC236}">
+                <a16:creationId xmlns:a16="http://schemas.microsoft.com/office/drawing/2014/main" id="{738ECA10-0450-4A1A-A81A-479C99AA01BD}"/>
+              </a:ext>
+            </a:extLst>
+          </p:cNvPr>
+          <p:cNvSpPr>
+            <a:spLocks noGrp="1"/>
+          </p:cNvSpPr>
+          <p:nvPr>
+            <p:ph type="title"/>
+          </p:nvPr>
+        </p:nvSpPr>
+        <p:spPr/>
+        <p:txBody>
+          <a:bodyPr/>
+          <a:lstStyle/>
+          <a:p>
+            <a:r>
+              <a:rPr lang="en-IN" dirty="0"/>
+              <a:t>YOLO</a:t>
+            </a:r>
+          </a:p>
+        </p:txBody>
+      </p:sp>
+      <p:sp>
+        <p:nvSpPr>
+          <p:cNvPr id="3" name="Content Placeholder 2">
+            <a:extLst>
+              <a:ext uri="{FF2B5EF4-FFF2-40B4-BE49-F238E27FC236}">
+                <a16:creationId xmlns:a16="http://schemas.microsoft.com/office/drawing/2014/main" id="{D5C90EA1-A2F9-4674-B6F3-54DA2F809447}"/>
+              </a:ext>
+            </a:extLst>
+          </p:cNvPr>
+          <p:cNvSpPr>
+            <a:spLocks noGrp="1"/>
+          </p:cNvSpPr>
+          <p:nvPr>
+            <p:ph idx="1"/>
+          </p:nvPr>
+        </p:nvSpPr>
+        <p:spPr/>
+        <p:txBody>
+          <a:bodyPr>
+            <a:normAutofit fontScale="92500" lnSpcReduction="20000"/>
+          </a:bodyPr>
+          <a:lstStyle/>
+          <a:p>
+            <a:pPr marL="0" indent="0">
+              <a:buNone/>
+            </a:pPr>
+            <a:r>
+              <a:rPr lang="en-US" dirty="0"/>
+              <a:t>For each bounding box, the cell also predicts a class.</a:t>
+            </a:r>
+          </a:p>
+          <a:p>
+            <a:pPr marL="0" indent="0">
+              <a:buNone/>
+            </a:pPr>
+            <a:r>
+              <a:rPr lang="en-US" dirty="0"/>
+              <a:t>This works just like a classifier: it gives a probability distribution over all the possible classes.</a:t>
+            </a:r>
+          </a:p>
+          <a:p>
+            <a:pPr marL="0" indent="0">
+              <a:buNone/>
+            </a:pPr>
+            <a:r>
+              <a:rPr lang="en-US" dirty="0"/>
+              <a:t>YOLO was trained on the PASCAL VOC dataset, which can detect 20 different classes such as:</a:t>
+            </a:r>
+          </a:p>
+          <a:p>
+            <a:r>
+              <a:rPr lang="en-US" dirty="0"/>
+              <a:t>bicycle</a:t>
+            </a:r>
+          </a:p>
+          <a:p>
+            <a:r>
+              <a:rPr lang="en-US" dirty="0"/>
+              <a:t>boat</a:t>
+            </a:r>
+          </a:p>
+          <a:p>
+            <a:r>
+              <a:rPr lang="en-US" dirty="0"/>
+              <a:t>car</a:t>
+            </a:r>
+          </a:p>
+          <a:p>
+            <a:r>
+              <a:rPr lang="en-US" dirty="0"/>
+              <a:t>cat</a:t>
+            </a:r>
+          </a:p>
+          <a:p>
+            <a:r>
+              <a:rPr lang="en-US" dirty="0"/>
+              <a:t>dog</a:t>
+            </a:r>
+          </a:p>
+          <a:p>
+            <a:r>
+              <a:rPr lang="en-US" dirty="0"/>
+              <a:t>person</a:t>
+            </a:r>
+          </a:p>
+          <a:p>
+            <a:endParaRPr lang="en-IN" dirty="0"/>
+          </a:p>
+        </p:txBody>
+      </p:sp>
+      <p:pic>
+        <p:nvPicPr>
+          <p:cNvPr id="2050" name="Picture 2" descr="Alt Text">
+            <a:extLst>
+              <a:ext uri="{FF2B5EF4-FFF2-40B4-BE49-F238E27FC236}">
+                <a16:creationId xmlns:a16="http://schemas.microsoft.com/office/drawing/2014/main" id="{FEEF85E6-CBEA-417F-99FC-F3B7DBE3B331}"/>
+              </a:ext>
+            </a:extLst>
+          </p:cNvPr>
+          <p:cNvPicPr>
+            <a:picLocks noChangeAspect="1" noChangeArrowheads="1"/>
+          </p:cNvPicPr>
+          <p:nvPr/>
+        </p:nvPicPr>
+        <p:blipFill>
+          <a:blip r:embed="rId2">
+            <a:extLst>
+              <a:ext uri="{28A0092B-C50C-407E-A947-70E740481C1C}">
+                <a14:useLocalDpi xmlns:a14="http://schemas.microsoft.com/office/drawing/2010/main" val="0"/>
+              </a:ext>
+            </a:extLst>
+          </a:blip>
+          <a:srcRect/>
+          <a:stretch>
+            <a:fillRect/>
+          </a:stretch>
+        </p:blipFill>
+        <p:spPr bwMode="auto">
+          <a:xfrm>
+            <a:off x="8262407" y="3464983"/>
+            <a:ext cx="2846917" cy="2846917"/>
+          </a:xfrm>
+          <a:prstGeom prst="rect">
+            <a:avLst/>
+          </a:prstGeom>
+          <a:noFill/>
+          <a:extLst>
+            <a:ext uri="{909E8E84-426E-40DD-AFC4-6F175D3DCCD1}">
+              <a14:hiddenFill xmlns:a14="http://schemas.microsoft.com/office/drawing/2010/main">
+                <a:solidFill>
+                  <a:srgbClr val="FFFFFF"/>
+                </a:solidFill>
+              </a14:hiddenFill>
+            </a:ext>
+          </a:extLst>
+        </p:spPr>
+      </p:pic>
+    </p:spTree>
+    <p:extLst>
+      <p:ext uri="{BB962C8B-B14F-4D97-AF65-F5344CB8AC3E}">
+        <p14:creationId xmlns:p14="http://schemas.microsoft.com/office/powerpoint/2010/main" val="1386513120"/>
+      </p:ext>
+    </p:extLst>
+  </p:cSld>
+  <p:clrMapOvr>
+    <a:masterClrMapping/>
+  </p:clrMapOvr>
+</p:sld>
+</file>
+
+<file path=ppt/slides/slide4.xml><?xml version="1.0" encoding="utf-8"?>
+<p:sld xmlns:a="http://schemas.openxmlformats.org/drawingml/2006/main" xmlns:r="http://schemas.openxmlformats.org/officeDocument/2006/relationships" xmlns:p="http://schemas.openxmlformats.org/presentationml/2006/main">
+  <p:cSld>
+    <p:spTree>
+      <p:nvGrpSpPr>
+        <p:cNvPr id="1" name=""/>
+        <p:cNvGrpSpPr/>
+        <p:nvPr/>
+      </p:nvGrpSpPr>
+      <p:grpSpPr>
+        <a:xfrm>
+          <a:off x="0" y="0"/>
+          <a:ext cx="0" cy="0"/>
+          <a:chOff x="0" y="0"/>
+          <a:chExt cx="0" cy="0"/>
+        </a:xfrm>
+      </p:grpSpPr>
+      <p:sp>
+        <p:nvSpPr>
+          <p:cNvPr id="2" name="Title 1">
+            <a:extLst>
+              <a:ext uri="{FF2B5EF4-FFF2-40B4-BE49-F238E27FC236}">
+                <a16:creationId xmlns:a16="http://schemas.microsoft.com/office/drawing/2014/main" id="{08BCC1E7-FADE-45E0-A21B-D15483DBE405}"/>
+              </a:ext>
+            </a:extLst>
+          </p:cNvPr>
+          <p:cNvSpPr>
+            <a:spLocks noGrp="1"/>
+          </p:cNvSpPr>
+          <p:nvPr>
+            <p:ph type="title"/>
+          </p:nvPr>
+        </p:nvSpPr>
+        <p:spPr/>
+        <p:txBody>
+          <a:bodyPr/>
+          <a:lstStyle/>
+          <a:p>
+            <a:r>
+              <a:rPr lang="en-IN" dirty="0"/>
+              <a:t>YOLO</a:t>
+            </a:r>
+          </a:p>
+        </p:txBody>
+      </p:sp>
+      <p:sp>
+        <p:nvSpPr>
+          <p:cNvPr id="3" name="Content Placeholder 2">
+            <a:extLst>
+              <a:ext uri="{FF2B5EF4-FFF2-40B4-BE49-F238E27FC236}">
+                <a16:creationId xmlns:a16="http://schemas.microsoft.com/office/drawing/2014/main" id="{7440087A-76BE-4C7F-B6AB-3E4490D2582A}"/>
+              </a:ext>
+            </a:extLst>
+          </p:cNvPr>
+          <p:cNvSpPr>
+            <a:spLocks noGrp="1"/>
+          </p:cNvSpPr>
+          <p:nvPr>
+            <p:ph idx="1"/>
+          </p:nvPr>
+        </p:nvSpPr>
+        <p:spPr/>
+        <p:txBody>
+          <a:bodyPr/>
+          <a:lstStyle/>
+          <a:p>
+            <a:r>
+              <a:rPr lang="en-US" dirty="0"/>
+              <a:t>The confidence score for the bounding box and the class prediction are combined into one final score that tells us the probability that this bounding box contains a specific type of object.</a:t>
+            </a:r>
+            <a:endParaRPr lang="en-IN" dirty="0"/>
+          </a:p>
+        </p:txBody>
+      </p:sp>
+      <p:pic>
+        <p:nvPicPr>
+          <p:cNvPr id="3074" name="Picture 2" descr="Alt Text">
+            <a:extLst>
+              <a:ext uri="{FF2B5EF4-FFF2-40B4-BE49-F238E27FC236}">
+                <a16:creationId xmlns:a16="http://schemas.microsoft.com/office/drawing/2014/main" id="{3B118F11-6AC3-463B-93D7-394C35503A98}"/>
+              </a:ext>
+            </a:extLst>
+          </p:cNvPr>
+          <p:cNvPicPr>
+            <a:picLocks noChangeAspect="1" noChangeArrowheads="1"/>
+          </p:cNvPicPr>
+          <p:nvPr/>
+        </p:nvPicPr>
+        <p:blipFill>
+          <a:blip r:embed="rId2">
+            <a:extLst>
+              <a:ext uri="{28A0092B-C50C-407E-A947-70E740481C1C}">
+                <a14:useLocalDpi xmlns:a14="http://schemas.microsoft.com/office/drawing/2010/main" val="0"/>
+              </a:ext>
+            </a:extLst>
+          </a:blip>
+          <a:srcRect/>
+          <a:stretch>
+            <a:fillRect/>
+          </a:stretch>
+        </p:blipFill>
+        <p:spPr bwMode="auto">
+          <a:xfrm>
+            <a:off x="7806266" y="3131608"/>
+            <a:ext cx="3180292" cy="3180292"/>
+          </a:xfrm>
+          <a:prstGeom prst="rect">
+            <a:avLst/>
+          </a:prstGeom>
+          <a:noFill/>
+          <a:extLst>
+            <a:ext uri="{909E8E84-426E-40DD-AFC4-6F175D3DCCD1}">
+              <a14:hiddenFill xmlns:a14="http://schemas.microsoft.com/office/drawing/2010/main">
+                <a:solidFill>
+                  <a:srgbClr val="FFFFFF"/>
+                </a:solidFill>
+              </a14:hiddenFill>
+            </a:ext>
+          </a:extLst>
+        </p:spPr>
+      </p:pic>
+    </p:spTree>
+    <p:extLst>
+      <p:ext uri="{BB962C8B-B14F-4D97-AF65-F5344CB8AC3E}">
+        <p14:creationId xmlns:p14="http://schemas.microsoft.com/office/powerpoint/2010/main" val="4107004856"/>
+      </p:ext>
+    </p:extLst>
+  </p:cSld>
+  <p:clrMapOvr>
+    <a:masterClrMapping/>
+  </p:clrMapOvr>
+</p:sld>
+</file>
+
+<file path=ppt/slides/slide5.xml><?xml version="1.0" encoding="utf-8"?>
+<p:sld xmlns:a="http://schemas.openxmlformats.org/drawingml/2006/main" xmlns:r="http://schemas.openxmlformats.org/officeDocument/2006/relationships" xmlns:p="http://schemas.openxmlformats.org/presentationml/2006/main">
+  <p:cSld>
+    <p:spTree>
+      <p:nvGrpSpPr>
+        <p:cNvPr id="1" name=""/>
+        <p:cNvGrpSpPr/>
+        <p:nvPr/>
+      </p:nvGrpSpPr>
+      <p:grpSpPr>
+        <a:xfrm>
+          <a:off x="0" y="0"/>
+          <a:ext cx="0" cy="0"/>
+          <a:chOff x="0" y="0"/>
+          <a:chExt cx="0" cy="0"/>
+        </a:xfrm>
+      </p:grpSpPr>
+      <p:sp>
+        <p:nvSpPr>
+          <p:cNvPr id="2" name="Title 1">
+            <a:extLst>
+              <a:ext uri="{FF2B5EF4-FFF2-40B4-BE49-F238E27FC236}">
+                <a16:creationId xmlns:a16="http://schemas.microsoft.com/office/drawing/2014/main" id="{7C3B2378-95CA-44C8-8543-458B39FCA721}"/>
+              </a:ext>
+            </a:extLst>
+          </p:cNvPr>
+          <p:cNvSpPr>
+            <a:spLocks noGrp="1"/>
+          </p:cNvSpPr>
+          <p:nvPr>
+            <p:ph type="title"/>
+          </p:nvPr>
+        </p:nvSpPr>
+        <p:spPr/>
+        <p:txBody>
+          <a:bodyPr/>
+          <a:lstStyle/>
+          <a:p>
+            <a:r>
+              <a:rPr lang="en-IN" dirty="0"/>
+              <a:t>YOLO</a:t>
+            </a:r>
+          </a:p>
+        </p:txBody>
+      </p:sp>
+      <p:sp>
+        <p:nvSpPr>
+          <p:cNvPr id="3" name="Content Placeholder 2">
+            <a:extLst>
+              <a:ext uri="{FF2B5EF4-FFF2-40B4-BE49-F238E27FC236}">
+                <a16:creationId xmlns:a16="http://schemas.microsoft.com/office/drawing/2014/main" id="{58DBC762-275F-4A73-8C63-7C42273BE3F1}"/>
+              </a:ext>
+            </a:extLst>
+          </p:cNvPr>
+          <p:cNvSpPr>
+            <a:spLocks noGrp="1"/>
+          </p:cNvSpPr>
+          <p:nvPr>
+            <p:ph idx="1"/>
+          </p:nvPr>
+        </p:nvSpPr>
+        <p:spPr>
+          <a:xfrm>
+            <a:off x="838200" y="1825625"/>
+            <a:ext cx="6866467" cy="4351338"/>
+          </a:xfrm>
+        </p:spPr>
+        <p:txBody>
+          <a:bodyPr/>
+          <a:lstStyle/>
+          <a:p>
+            <a:r>
+              <a:rPr lang="en-US" dirty="0"/>
+              <a:t>Since there are 13×13 = 169 grid cells and each cell predicts 5 bounding boxes, we end up with 845 bounding boxes in total.</a:t>
+            </a:r>
+          </a:p>
+          <a:p>
+            <a:r>
+              <a:rPr lang="en-US" dirty="0"/>
+              <a:t>It turns out that most of these boxes will have very low confidence scores, so we only keep the boxes whose final score is 30% or more</a:t>
+            </a:r>
+          </a:p>
+          <a:p>
+            <a:endParaRPr lang="en-IN" dirty="0"/>
+          </a:p>
+        </p:txBody>
+      </p:sp>
+      <p:pic>
+        <p:nvPicPr>
+          <p:cNvPr id="4098" name="Picture 2" descr="Alt Text">
+            <a:extLst>
+              <a:ext uri="{FF2B5EF4-FFF2-40B4-BE49-F238E27FC236}">
+                <a16:creationId xmlns:a16="http://schemas.microsoft.com/office/drawing/2014/main" id="{2E57F84F-22A4-4179-8384-CE3A37A1F004}"/>
+              </a:ext>
+            </a:extLst>
+          </p:cNvPr>
+          <p:cNvPicPr>
+            <a:picLocks noChangeAspect="1" noChangeArrowheads="1"/>
+          </p:cNvPicPr>
+          <p:nvPr/>
+        </p:nvPicPr>
+        <p:blipFill>
+          <a:blip r:embed="rId2">
+            <a:extLst>
+              <a:ext uri="{28A0092B-C50C-407E-A947-70E740481C1C}">
+                <a14:useLocalDpi xmlns:a14="http://schemas.microsoft.com/office/drawing/2010/main" val="0"/>
+              </a:ext>
+            </a:extLst>
+          </a:blip>
+          <a:srcRect/>
+          <a:stretch>
+            <a:fillRect/>
+          </a:stretch>
+        </p:blipFill>
+        <p:spPr bwMode="auto">
+          <a:xfrm>
+            <a:off x="7704667" y="2527830"/>
+            <a:ext cx="3649133" cy="3649133"/>
+          </a:xfrm>
+          <a:prstGeom prst="rect">
+            <a:avLst/>
+          </a:prstGeom>
+          <a:noFill/>
+          <a:extLst>
+            <a:ext uri="{909E8E84-426E-40DD-AFC4-6F175D3DCCD1}">
+              <a14:hiddenFill xmlns:a14="http://schemas.microsoft.com/office/drawing/2010/main">
+                <a:solidFill>
+                  <a:srgbClr val="FFFFFF"/>
+                </a:solidFill>
+              </a14:hiddenFill>
+            </a:ext>
+          </a:extLst>
+        </p:spPr>
+      </p:pic>
+    </p:spTree>
+    <p:extLst>
+      <p:ext uri="{BB962C8B-B14F-4D97-AF65-F5344CB8AC3E}">
+        <p14:creationId xmlns:p14="http://schemas.microsoft.com/office/powerpoint/2010/main" val="473075349"/>
+      </p:ext>
+    </p:extLst>
+  </p:cSld>
+  <p:clrMapOvr>
+    <a:masterClrMapping/>
+  </p:clrMapOvr>
+</p:sld>
+</file>
+
+<file path=ppt/slides/slide6.xml><?xml version="1.0" encoding="utf-8"?>
+<p:sld xmlns:a="http://schemas.openxmlformats.org/drawingml/2006/main" xmlns:r="http://schemas.openxmlformats.org/officeDocument/2006/relationships" xmlns:p="http://schemas.openxmlformats.org/presentationml/2006/main">
+  <p:cSld>
+    <p:spTree>
+      <p:nvGrpSpPr>
+        <p:cNvPr id="1" name=""/>
+        <p:cNvGrpSpPr/>
+        <p:nvPr/>
+      </p:nvGrpSpPr>
+      <p:grpSpPr>
+        <a:xfrm>
+          <a:off x="0" y="0"/>
+          <a:ext cx="0" cy="0"/>
+          <a:chOff x="0" y="0"/>
+          <a:chExt cx="0" cy="0"/>
+        </a:xfrm>
+      </p:grpSpPr>
+      <p:sp>
+        <p:nvSpPr>
+          <p:cNvPr id="2" name="Title 1">
+            <a:extLst>
+              <a:ext uri="{FF2B5EF4-FFF2-40B4-BE49-F238E27FC236}">
                 <a16:creationId xmlns:a16="http://schemas.microsoft.com/office/drawing/2014/main" id="{12381C36-C8EE-410D-A14C-48FB9D631EB6}"/>
               </a:ext>
             </a:extLst>
@@ -3821,7 +4439,7 @@
 </p:sld>
 </file>
 
-<file path=ppt/slides/slide3.xml><?xml version="1.0" encoding="utf-8"?>
+<file path=ppt/slides/slide7.xml><?xml version="1.0" encoding="utf-8"?>
 <p:sld xmlns:a="http://schemas.openxmlformats.org/drawingml/2006/main" xmlns:r="http://schemas.openxmlformats.org/officeDocument/2006/relationships" xmlns:p="http://schemas.openxmlformats.org/presentationml/2006/main">
   <p:cSld>
     <p:spTree>
@@ -3928,7 +4546,7 @@
 </p:sld>
 </file>
 
-<file path=ppt/slides/slide4.xml><?xml version="1.0" encoding="utf-8"?>
+<file path=ppt/slides/slide8.xml><?xml version="1.0" encoding="utf-8"?>
 <p:sld xmlns:a="http://schemas.openxmlformats.org/drawingml/2006/main" xmlns:r="http://schemas.openxmlformats.org/officeDocument/2006/relationships" xmlns:p="http://schemas.openxmlformats.org/presentationml/2006/main">
   <p:cSld>
     <p:spTree>
@@ -4035,7 +4653,7 @@
 </p:sld>
 </file>
 
-<file path=ppt/slides/slide5.xml><?xml version="1.0" encoding="utf-8"?>
+<file path=ppt/slides/slide9.xml><?xml version="1.0" encoding="utf-8"?>
 <p:sld xmlns:a="http://schemas.openxmlformats.org/drawingml/2006/main" xmlns:r="http://schemas.openxmlformats.org/officeDocument/2006/relationships" xmlns:p="http://schemas.openxmlformats.org/presentationml/2006/main">
   <p:cSld>
     <p:spTree>
@@ -4137,624 +4755,6 @@
     <p:extLst>
       <p:ext uri="{BB962C8B-B14F-4D97-AF65-F5344CB8AC3E}">
         <p14:creationId xmlns:p14="http://schemas.microsoft.com/office/powerpoint/2010/main" val="3330399713"/>
-      </p:ext>
-    </p:extLst>
-  </p:cSld>
-  <p:clrMapOvr>
-    <a:masterClrMapping/>
-  </p:clrMapOvr>
-</p:sld>
-</file>
-
-<file path=ppt/slides/slide6.xml><?xml version="1.0" encoding="utf-8"?>
-<p:sld xmlns:a="http://schemas.openxmlformats.org/drawingml/2006/main" xmlns:r="http://schemas.openxmlformats.org/officeDocument/2006/relationships" xmlns:p="http://schemas.openxmlformats.org/presentationml/2006/main">
-  <p:cSld>
-    <p:spTree>
-      <p:nvGrpSpPr>
-        <p:cNvPr id="1" name=""/>
-        <p:cNvGrpSpPr/>
-        <p:nvPr/>
-      </p:nvGrpSpPr>
-      <p:grpSpPr>
-        <a:xfrm>
-          <a:off x="0" y="0"/>
-          <a:ext cx="0" cy="0"/>
-          <a:chOff x="0" y="0"/>
-          <a:chExt cx="0" cy="0"/>
-        </a:xfrm>
-      </p:grpSpPr>
-      <p:sp>
-        <p:nvSpPr>
-          <p:cNvPr id="2" name="Title 1">
-            <a:extLst>
-              <a:ext uri="{FF2B5EF4-FFF2-40B4-BE49-F238E27FC236}">
-                <a16:creationId xmlns:a16="http://schemas.microsoft.com/office/drawing/2014/main" id="{0FDCA47D-4704-4B1D-849B-3D9F53B708FF}"/>
-              </a:ext>
-            </a:extLst>
-          </p:cNvPr>
-          <p:cNvSpPr>
-            <a:spLocks noGrp="1"/>
-          </p:cNvSpPr>
-          <p:nvPr>
-            <p:ph type="title"/>
-          </p:nvPr>
-        </p:nvSpPr>
-        <p:spPr/>
-        <p:txBody>
-          <a:bodyPr/>
-          <a:lstStyle/>
-          <a:p>
-            <a:r>
-              <a:rPr lang="en-IN" dirty="0"/>
-              <a:t>YOLO</a:t>
-            </a:r>
-          </a:p>
-        </p:txBody>
-      </p:sp>
-      <p:sp>
-        <p:nvSpPr>
-          <p:cNvPr id="3" name="Content Placeholder 2">
-            <a:extLst>
-              <a:ext uri="{FF2B5EF4-FFF2-40B4-BE49-F238E27FC236}">
-                <a16:creationId xmlns:a16="http://schemas.microsoft.com/office/drawing/2014/main" id="{225A9CBB-56EF-439F-B4B4-42094E01F37C}"/>
-              </a:ext>
-            </a:extLst>
-          </p:cNvPr>
-          <p:cNvSpPr>
-            <a:spLocks noGrp="1"/>
-          </p:cNvSpPr>
-          <p:nvPr>
-            <p:ph idx="1"/>
-          </p:nvPr>
-        </p:nvSpPr>
-        <p:spPr/>
-        <p:txBody>
-          <a:bodyPr/>
-          <a:lstStyle/>
-          <a:p>
-            <a:r>
-              <a:rPr lang="en-US" dirty="0"/>
-              <a:t>YOLO actually looks at the image just once (hence its name: You Only Look Once) but in a clever way.</a:t>
-            </a:r>
-          </a:p>
-          <a:p>
-            <a:r>
-              <a:rPr lang="en-US" dirty="0"/>
-              <a:t>YOLO divides up the image into a grid of 13 by 13 cells:</a:t>
-            </a:r>
-          </a:p>
-          <a:p>
-            <a:endParaRPr lang="en-IN" dirty="0"/>
-          </a:p>
-        </p:txBody>
-      </p:sp>
-      <p:pic>
-        <p:nvPicPr>
-          <p:cNvPr id="1026" name="Picture 2" descr="Alt Text">
-            <a:extLst>
-              <a:ext uri="{FF2B5EF4-FFF2-40B4-BE49-F238E27FC236}">
-                <a16:creationId xmlns:a16="http://schemas.microsoft.com/office/drawing/2014/main" id="{45787048-A5B7-4C6B-9476-C4F87C2254A5}"/>
-              </a:ext>
-            </a:extLst>
-          </p:cNvPr>
-          <p:cNvPicPr>
-            <a:picLocks noChangeAspect="1" noChangeArrowheads="1"/>
-          </p:cNvPicPr>
-          <p:nvPr/>
-        </p:nvPicPr>
-        <p:blipFill>
-          <a:blip r:embed="rId2">
-            <a:extLst>
-              <a:ext uri="{28A0092B-C50C-407E-A947-70E740481C1C}">
-                <a14:useLocalDpi xmlns:a14="http://schemas.microsoft.com/office/drawing/2010/main" val="0"/>
-              </a:ext>
-            </a:extLst>
-          </a:blip>
-          <a:srcRect/>
-          <a:stretch>
-            <a:fillRect/>
-          </a:stretch>
-        </p:blipFill>
-        <p:spPr bwMode="auto">
-          <a:xfrm>
-            <a:off x="3842808" y="3429000"/>
-            <a:ext cx="3015192" cy="3015192"/>
-          </a:xfrm>
-          <a:prstGeom prst="rect">
-            <a:avLst/>
-          </a:prstGeom>
-          <a:noFill/>
-          <a:extLst>
-            <a:ext uri="{909E8E84-426E-40DD-AFC4-6F175D3DCCD1}">
-              <a14:hiddenFill xmlns:a14="http://schemas.microsoft.com/office/drawing/2010/main">
-                <a:solidFill>
-                  <a:srgbClr val="FFFFFF"/>
-                </a:solidFill>
-              </a14:hiddenFill>
-            </a:ext>
-          </a:extLst>
-        </p:spPr>
-      </p:pic>
-    </p:spTree>
-    <p:extLst>
-      <p:ext uri="{BB962C8B-B14F-4D97-AF65-F5344CB8AC3E}">
-        <p14:creationId xmlns:p14="http://schemas.microsoft.com/office/powerpoint/2010/main" val="796314057"/>
-      </p:ext>
-    </p:extLst>
-  </p:cSld>
-  <p:clrMapOvr>
-    <a:masterClrMapping/>
-  </p:clrMapOvr>
-</p:sld>
-</file>
-
-<file path=ppt/slides/slide7.xml><?xml version="1.0" encoding="utf-8"?>
-<p:sld xmlns:a="http://schemas.openxmlformats.org/drawingml/2006/main" xmlns:r="http://schemas.openxmlformats.org/officeDocument/2006/relationships" xmlns:p="http://schemas.openxmlformats.org/presentationml/2006/main">
-  <p:cSld>
-    <p:spTree>
-      <p:nvGrpSpPr>
-        <p:cNvPr id="1" name=""/>
-        <p:cNvGrpSpPr/>
-        <p:nvPr/>
-      </p:nvGrpSpPr>
-      <p:grpSpPr>
-        <a:xfrm>
-          <a:off x="0" y="0"/>
-          <a:ext cx="0" cy="0"/>
-          <a:chOff x="0" y="0"/>
-          <a:chExt cx="0" cy="0"/>
-        </a:xfrm>
-      </p:grpSpPr>
-      <p:sp>
-        <p:nvSpPr>
-          <p:cNvPr id="2" name="Title 1">
-            <a:extLst>
-              <a:ext uri="{FF2B5EF4-FFF2-40B4-BE49-F238E27FC236}">
-                <a16:creationId xmlns:a16="http://schemas.microsoft.com/office/drawing/2014/main" id="{738ECA10-0450-4A1A-A81A-479C99AA01BD}"/>
-              </a:ext>
-            </a:extLst>
-          </p:cNvPr>
-          <p:cNvSpPr>
-            <a:spLocks noGrp="1"/>
-          </p:cNvSpPr>
-          <p:nvPr>
-            <p:ph type="title"/>
-          </p:nvPr>
-        </p:nvSpPr>
-        <p:spPr/>
-        <p:txBody>
-          <a:bodyPr/>
-          <a:lstStyle/>
-          <a:p>
-            <a:r>
-              <a:rPr lang="en-IN" dirty="0"/>
-              <a:t>YOLO</a:t>
-            </a:r>
-          </a:p>
-        </p:txBody>
-      </p:sp>
-      <p:sp>
-        <p:nvSpPr>
-          <p:cNvPr id="3" name="Content Placeholder 2">
-            <a:extLst>
-              <a:ext uri="{FF2B5EF4-FFF2-40B4-BE49-F238E27FC236}">
-                <a16:creationId xmlns:a16="http://schemas.microsoft.com/office/drawing/2014/main" id="{D5C90EA1-A2F9-4674-B6F3-54DA2F809447}"/>
-              </a:ext>
-            </a:extLst>
-          </p:cNvPr>
-          <p:cNvSpPr>
-            <a:spLocks noGrp="1"/>
-          </p:cNvSpPr>
-          <p:nvPr>
-            <p:ph idx="1"/>
-          </p:nvPr>
-        </p:nvSpPr>
-        <p:spPr/>
-        <p:txBody>
-          <a:bodyPr>
-            <a:normAutofit fontScale="92500" lnSpcReduction="20000"/>
-          </a:bodyPr>
-          <a:lstStyle/>
-          <a:p>
-            <a:pPr marL="0" indent="0">
-              <a:buNone/>
-            </a:pPr>
-            <a:r>
-              <a:rPr lang="en-US" dirty="0"/>
-              <a:t>For each bounding box, the cell also predicts a class.</a:t>
-            </a:r>
-          </a:p>
-          <a:p>
-            <a:pPr marL="0" indent="0">
-              <a:buNone/>
-            </a:pPr>
-            <a:r>
-              <a:rPr lang="en-US" dirty="0"/>
-              <a:t>This works just like a classifier: it gives a probability distribution over all the possible classes.</a:t>
-            </a:r>
-          </a:p>
-          <a:p>
-            <a:pPr marL="0" indent="0">
-              <a:buNone/>
-            </a:pPr>
-            <a:r>
-              <a:rPr lang="en-US" dirty="0"/>
-              <a:t>YOLO was trained on the PASCAL VOC dataset, which can detect 20 different classes such as:</a:t>
-            </a:r>
-          </a:p>
-          <a:p>
-            <a:r>
-              <a:rPr lang="en-US" dirty="0"/>
-              <a:t>bicycle</a:t>
-            </a:r>
-          </a:p>
-          <a:p>
-            <a:r>
-              <a:rPr lang="en-US" dirty="0"/>
-              <a:t>boat</a:t>
-            </a:r>
-          </a:p>
-          <a:p>
-            <a:r>
-              <a:rPr lang="en-US" dirty="0"/>
-              <a:t>car</a:t>
-            </a:r>
-          </a:p>
-          <a:p>
-            <a:r>
-              <a:rPr lang="en-US" dirty="0"/>
-              <a:t>cat</a:t>
-            </a:r>
-          </a:p>
-          <a:p>
-            <a:r>
-              <a:rPr lang="en-US" dirty="0"/>
-              <a:t>dog</a:t>
-            </a:r>
-          </a:p>
-          <a:p>
-            <a:r>
-              <a:rPr lang="en-US" dirty="0"/>
-              <a:t>person</a:t>
-            </a:r>
-          </a:p>
-          <a:p>
-            <a:endParaRPr lang="en-IN" dirty="0"/>
-          </a:p>
-        </p:txBody>
-      </p:sp>
-      <p:pic>
-        <p:nvPicPr>
-          <p:cNvPr id="2050" name="Picture 2" descr="Alt Text">
-            <a:extLst>
-              <a:ext uri="{FF2B5EF4-FFF2-40B4-BE49-F238E27FC236}">
-                <a16:creationId xmlns:a16="http://schemas.microsoft.com/office/drawing/2014/main" id="{FEEF85E6-CBEA-417F-99FC-F3B7DBE3B331}"/>
-              </a:ext>
-            </a:extLst>
-          </p:cNvPr>
-          <p:cNvPicPr>
-            <a:picLocks noChangeAspect="1" noChangeArrowheads="1"/>
-          </p:cNvPicPr>
-          <p:nvPr/>
-        </p:nvPicPr>
-        <p:blipFill>
-          <a:blip r:embed="rId2">
-            <a:extLst>
-              <a:ext uri="{28A0092B-C50C-407E-A947-70E740481C1C}">
-                <a14:useLocalDpi xmlns:a14="http://schemas.microsoft.com/office/drawing/2010/main" val="0"/>
-              </a:ext>
-            </a:extLst>
-          </a:blip>
-          <a:srcRect/>
-          <a:stretch>
-            <a:fillRect/>
-          </a:stretch>
-        </p:blipFill>
-        <p:spPr bwMode="auto">
-          <a:xfrm>
-            <a:off x="8262407" y="3464983"/>
-            <a:ext cx="2846917" cy="2846917"/>
-          </a:xfrm>
-          <a:prstGeom prst="rect">
-            <a:avLst/>
-          </a:prstGeom>
-          <a:noFill/>
-          <a:extLst>
-            <a:ext uri="{909E8E84-426E-40DD-AFC4-6F175D3DCCD1}">
-              <a14:hiddenFill xmlns:a14="http://schemas.microsoft.com/office/drawing/2010/main">
-                <a:solidFill>
-                  <a:srgbClr val="FFFFFF"/>
-                </a:solidFill>
-              </a14:hiddenFill>
-            </a:ext>
-          </a:extLst>
-        </p:spPr>
-      </p:pic>
-    </p:spTree>
-    <p:extLst>
-      <p:ext uri="{BB962C8B-B14F-4D97-AF65-F5344CB8AC3E}">
-        <p14:creationId xmlns:p14="http://schemas.microsoft.com/office/powerpoint/2010/main" val="3077851859"/>
-      </p:ext>
-    </p:extLst>
-  </p:cSld>
-  <p:clrMapOvr>
-    <a:masterClrMapping/>
-  </p:clrMapOvr>
-</p:sld>
-</file>
-
-<file path=ppt/slides/slide8.xml><?xml version="1.0" encoding="utf-8"?>
-<p:sld xmlns:a="http://schemas.openxmlformats.org/drawingml/2006/main" xmlns:r="http://schemas.openxmlformats.org/officeDocument/2006/relationships" xmlns:p="http://schemas.openxmlformats.org/presentationml/2006/main">
-  <p:cSld>
-    <p:spTree>
-      <p:nvGrpSpPr>
-        <p:cNvPr id="1" name=""/>
-        <p:cNvGrpSpPr/>
-        <p:nvPr/>
-      </p:nvGrpSpPr>
-      <p:grpSpPr>
-        <a:xfrm>
-          <a:off x="0" y="0"/>
-          <a:ext cx="0" cy="0"/>
-          <a:chOff x="0" y="0"/>
-          <a:chExt cx="0" cy="0"/>
-        </a:xfrm>
-      </p:grpSpPr>
-      <p:sp>
-        <p:nvSpPr>
-          <p:cNvPr id="2" name="Title 1">
-            <a:extLst>
-              <a:ext uri="{FF2B5EF4-FFF2-40B4-BE49-F238E27FC236}">
-                <a16:creationId xmlns:a16="http://schemas.microsoft.com/office/drawing/2014/main" id="{08BCC1E7-FADE-45E0-A21B-D15483DBE405}"/>
-              </a:ext>
-            </a:extLst>
-          </p:cNvPr>
-          <p:cNvSpPr>
-            <a:spLocks noGrp="1"/>
-          </p:cNvSpPr>
-          <p:nvPr>
-            <p:ph type="title"/>
-          </p:nvPr>
-        </p:nvSpPr>
-        <p:spPr/>
-        <p:txBody>
-          <a:bodyPr/>
-          <a:lstStyle/>
-          <a:p>
-            <a:r>
-              <a:rPr lang="en-IN" dirty="0"/>
-              <a:t>YOLO</a:t>
-            </a:r>
-          </a:p>
-        </p:txBody>
-      </p:sp>
-      <p:sp>
-        <p:nvSpPr>
-          <p:cNvPr id="3" name="Content Placeholder 2">
-            <a:extLst>
-              <a:ext uri="{FF2B5EF4-FFF2-40B4-BE49-F238E27FC236}">
-                <a16:creationId xmlns:a16="http://schemas.microsoft.com/office/drawing/2014/main" id="{7440087A-76BE-4C7F-B6AB-3E4490D2582A}"/>
-              </a:ext>
-            </a:extLst>
-          </p:cNvPr>
-          <p:cNvSpPr>
-            <a:spLocks noGrp="1"/>
-          </p:cNvSpPr>
-          <p:nvPr>
-            <p:ph idx="1"/>
-          </p:nvPr>
-        </p:nvSpPr>
-        <p:spPr/>
-        <p:txBody>
-          <a:bodyPr/>
-          <a:lstStyle/>
-          <a:p>
-            <a:r>
-              <a:rPr lang="en-US" dirty="0"/>
-              <a:t>The confidence score for the bounding box and the class prediction are combined into one final score that tells us the probability that this bounding box contains a specific type of object.</a:t>
-            </a:r>
-            <a:endParaRPr lang="en-IN" dirty="0"/>
-          </a:p>
-        </p:txBody>
-      </p:sp>
-      <p:pic>
-        <p:nvPicPr>
-          <p:cNvPr id="3074" name="Picture 2" descr="Alt Text">
-            <a:extLst>
-              <a:ext uri="{FF2B5EF4-FFF2-40B4-BE49-F238E27FC236}">
-                <a16:creationId xmlns:a16="http://schemas.microsoft.com/office/drawing/2014/main" id="{3B118F11-6AC3-463B-93D7-394C35503A98}"/>
-              </a:ext>
-            </a:extLst>
-          </p:cNvPr>
-          <p:cNvPicPr>
-            <a:picLocks noChangeAspect="1" noChangeArrowheads="1"/>
-          </p:cNvPicPr>
-          <p:nvPr/>
-        </p:nvPicPr>
-        <p:blipFill>
-          <a:blip r:embed="rId2">
-            <a:extLst>
-              <a:ext uri="{28A0092B-C50C-407E-A947-70E740481C1C}">
-                <a14:useLocalDpi xmlns:a14="http://schemas.microsoft.com/office/drawing/2010/main" val="0"/>
-              </a:ext>
-            </a:extLst>
-          </a:blip>
-          <a:srcRect/>
-          <a:stretch>
-            <a:fillRect/>
-          </a:stretch>
-        </p:blipFill>
-        <p:spPr bwMode="auto">
-          <a:xfrm>
-            <a:off x="7806266" y="3131608"/>
-            <a:ext cx="3180292" cy="3180292"/>
-          </a:xfrm>
-          <a:prstGeom prst="rect">
-            <a:avLst/>
-          </a:prstGeom>
-          <a:noFill/>
-          <a:extLst>
-            <a:ext uri="{909E8E84-426E-40DD-AFC4-6F175D3DCCD1}">
-              <a14:hiddenFill xmlns:a14="http://schemas.microsoft.com/office/drawing/2010/main">
-                <a:solidFill>
-                  <a:srgbClr val="FFFFFF"/>
-                </a:solidFill>
-              </a14:hiddenFill>
-            </a:ext>
-          </a:extLst>
-        </p:spPr>
-      </p:pic>
-    </p:spTree>
-    <p:extLst>
-      <p:ext uri="{BB962C8B-B14F-4D97-AF65-F5344CB8AC3E}">
-        <p14:creationId xmlns:p14="http://schemas.microsoft.com/office/powerpoint/2010/main" val="1255367399"/>
-      </p:ext>
-    </p:extLst>
-  </p:cSld>
-  <p:clrMapOvr>
-    <a:masterClrMapping/>
-  </p:clrMapOvr>
-</p:sld>
-</file>
-
-<file path=ppt/slides/slide9.xml><?xml version="1.0" encoding="utf-8"?>
-<p:sld xmlns:a="http://schemas.openxmlformats.org/drawingml/2006/main" xmlns:r="http://schemas.openxmlformats.org/officeDocument/2006/relationships" xmlns:p="http://schemas.openxmlformats.org/presentationml/2006/main">
-  <p:cSld>
-    <p:spTree>
-      <p:nvGrpSpPr>
-        <p:cNvPr id="1" name=""/>
-        <p:cNvGrpSpPr/>
-        <p:nvPr/>
-      </p:nvGrpSpPr>
-      <p:grpSpPr>
-        <a:xfrm>
-          <a:off x="0" y="0"/>
-          <a:ext cx="0" cy="0"/>
-          <a:chOff x="0" y="0"/>
-          <a:chExt cx="0" cy="0"/>
-        </a:xfrm>
-      </p:grpSpPr>
-      <p:sp>
-        <p:nvSpPr>
-          <p:cNvPr id="2" name="Title 1">
-            <a:extLst>
-              <a:ext uri="{FF2B5EF4-FFF2-40B4-BE49-F238E27FC236}">
-                <a16:creationId xmlns:a16="http://schemas.microsoft.com/office/drawing/2014/main" id="{7C3B2378-95CA-44C8-8543-458B39FCA721}"/>
-              </a:ext>
-            </a:extLst>
-          </p:cNvPr>
-          <p:cNvSpPr>
-            <a:spLocks noGrp="1"/>
-          </p:cNvSpPr>
-          <p:nvPr>
-            <p:ph type="title"/>
-          </p:nvPr>
-        </p:nvSpPr>
-        <p:spPr/>
-        <p:txBody>
-          <a:bodyPr/>
-          <a:lstStyle/>
-          <a:p>
-            <a:r>
-              <a:rPr lang="en-IN" dirty="0"/>
-              <a:t>YOLO</a:t>
-            </a:r>
-          </a:p>
-        </p:txBody>
-      </p:sp>
-      <p:sp>
-        <p:nvSpPr>
-          <p:cNvPr id="3" name="Content Placeholder 2">
-            <a:extLst>
-              <a:ext uri="{FF2B5EF4-FFF2-40B4-BE49-F238E27FC236}">
-                <a16:creationId xmlns:a16="http://schemas.microsoft.com/office/drawing/2014/main" id="{58DBC762-275F-4A73-8C63-7C42273BE3F1}"/>
-              </a:ext>
-            </a:extLst>
-          </p:cNvPr>
-          <p:cNvSpPr>
-            <a:spLocks noGrp="1"/>
-          </p:cNvSpPr>
-          <p:nvPr>
-            <p:ph idx="1"/>
-          </p:nvPr>
-        </p:nvSpPr>
-        <p:spPr>
-          <a:xfrm>
-            <a:off x="838200" y="1825625"/>
-            <a:ext cx="6866467" cy="4351338"/>
-          </a:xfrm>
-        </p:spPr>
-        <p:txBody>
-          <a:bodyPr/>
-          <a:lstStyle/>
-          <a:p>
-            <a:r>
-              <a:rPr lang="en-US" dirty="0"/>
-              <a:t>Since there are 13×13 = 169 grid cells and each cell predicts 5 bounding boxes, we end up with 845 bounding boxes in total.</a:t>
-            </a:r>
-          </a:p>
-          <a:p>
-            <a:r>
-              <a:rPr lang="en-US" dirty="0"/>
-              <a:t>It turns out that most of these boxes will have very low confidence scores, so we only keep the boxes whose final score is 30% or more</a:t>
-            </a:r>
-          </a:p>
-          <a:p>
-            <a:endParaRPr lang="en-IN" dirty="0"/>
-          </a:p>
-        </p:txBody>
-      </p:sp>
-      <p:pic>
-        <p:nvPicPr>
-          <p:cNvPr id="4098" name="Picture 2" descr="Alt Text">
-            <a:extLst>
-              <a:ext uri="{FF2B5EF4-FFF2-40B4-BE49-F238E27FC236}">
-                <a16:creationId xmlns:a16="http://schemas.microsoft.com/office/drawing/2014/main" id="{2E57F84F-22A4-4179-8384-CE3A37A1F004}"/>
-              </a:ext>
-            </a:extLst>
-          </p:cNvPr>
-          <p:cNvPicPr>
-            <a:picLocks noChangeAspect="1" noChangeArrowheads="1"/>
-          </p:cNvPicPr>
-          <p:nvPr/>
-        </p:nvPicPr>
-        <p:blipFill>
-          <a:blip r:embed="rId2">
-            <a:extLst>
-              <a:ext uri="{28A0092B-C50C-407E-A947-70E740481C1C}">
-                <a14:useLocalDpi xmlns:a14="http://schemas.microsoft.com/office/drawing/2010/main" val="0"/>
-              </a:ext>
-            </a:extLst>
-          </a:blip>
-          <a:srcRect/>
-          <a:stretch>
-            <a:fillRect/>
-          </a:stretch>
-        </p:blipFill>
-        <p:spPr bwMode="auto">
-          <a:xfrm>
-            <a:off x="7704667" y="2527830"/>
-            <a:ext cx="3649133" cy="3649133"/>
-          </a:xfrm>
-          <a:prstGeom prst="rect">
-            <a:avLst/>
-          </a:prstGeom>
-          <a:noFill/>
-          <a:extLst>
-            <a:ext uri="{909E8E84-426E-40DD-AFC4-6F175D3DCCD1}">
-              <a14:hiddenFill xmlns:a14="http://schemas.microsoft.com/office/drawing/2010/main">
-                <a:solidFill>
-                  <a:srgbClr val="FFFFFF"/>
-                </a:solidFill>
-              </a14:hiddenFill>
-            </a:ext>
-          </a:extLst>
-        </p:spPr>
-      </p:pic>
-    </p:spTree>
-    <p:extLst>
-      <p:ext uri="{BB962C8B-B14F-4D97-AF65-F5344CB8AC3E}">
-        <p14:creationId xmlns:p14="http://schemas.microsoft.com/office/powerpoint/2010/main" val="1152405582"/>
       </p:ext>
     </p:extLst>
   </p:cSld>

</xml_diff>